<commit_message>
Small changes to GUI pre-presentation
</commit_message>
<xml_diff>
--- a/Group20_ProjectPresentation.pptx
+++ b/Group20_ProjectPresentation.pptx
@@ -368,7 +368,7 @@
             <a:fld id="{34D8DEE8-7A87-4E01-8ADE-4C49CDD43F74}" type="datetime1">
               <a:rPr lang="en-US" smtClean="0"/>
               <a:pPr/>
-              <a:t>15-04-05</a:t>
+              <a:t>15-04-07</a:t>
             </a:fld>
             <a:endParaRPr lang="en-US" dirty="0"/>
           </a:p>
@@ -584,7 +584,7 @@
             <a:fld id="{7F8F9461-E3EB-40CD-B93F-E5CBBBD8E0BA}" type="datetimeFigureOut">
               <a:rPr lang="en-US" smtClean="0"/>
               <a:pPr/>
-              <a:t>15-04-05</a:t>
+              <a:t>15-04-07</a:t>
             </a:fld>
             <a:endParaRPr lang="en-US"/>
           </a:p>
@@ -853,7 +853,7 @@
             <a:fld id="{60578FA3-38AD-400D-A4D2-18E8EF129E5F}" type="datetime1">
               <a:rPr lang="en-US" smtClean="0"/>
               <a:pPr/>
-              <a:t>15-04-05</a:t>
+              <a:t>15-04-07</a:t>
             </a:fld>
             <a:endParaRPr lang="en-US"/>
           </a:p>
@@ -1005,7 +1005,7 @@
             <a:fld id="{A2EFF424-F111-43CB-9C75-D52325012943}" type="datetime1">
               <a:rPr lang="en-US" smtClean="0"/>
               <a:pPr/>
-              <a:t>15-04-05</a:t>
+              <a:t>15-04-07</a:t>
             </a:fld>
             <a:endParaRPr lang="en-US"/>
           </a:p>
@@ -1337,7 +1337,7 @@
             <a:fld id="{74A8BBF0-342D-409A-9C0A-B1B451E92883}" type="datetime1">
               <a:rPr lang="en-US" smtClean="0"/>
               <a:pPr/>
-              <a:t>15-04-05</a:t>
+              <a:t>15-04-07</a:t>
             </a:fld>
             <a:endParaRPr lang="en-US" dirty="0"/>
           </a:p>
@@ -1648,7 +1648,7 @@
             <a:fld id="{345DA190-4BDC-4D39-B5BB-A14B3E8B1B3D}" type="datetime1">
               <a:rPr lang="en-US" smtClean="0"/>
               <a:pPr/>
-              <a:t>15-04-05</a:t>
+              <a:t>15-04-07</a:t>
             </a:fld>
             <a:endParaRPr lang="en-US"/>
           </a:p>
@@ -2071,7 +2071,7 @@
             <a:fld id="{581D52F2-9B11-4FC0-9217-7D20B3AC9849}" type="datetime1">
               <a:rPr lang="en-US" smtClean="0"/>
               <a:pPr/>
-              <a:t>15-04-05</a:t>
+              <a:t>15-04-07</a:t>
             </a:fld>
             <a:endParaRPr lang="en-US"/>
           </a:p>
@@ -2186,7 +2186,7 @@
             <a:fld id="{4CF13737-8506-438E-ABC0-0BE7E06DCCA6}" type="datetime1">
               <a:rPr lang="en-US" smtClean="0"/>
               <a:pPr/>
-              <a:t>15-04-05</a:t>
+              <a:t>15-04-07</a:t>
             </a:fld>
             <a:endParaRPr lang="en-US"/>
           </a:p>
@@ -2347,7 +2347,7 @@
             <a:fld id="{941D58AA-1C84-40C9-BFEE-631CCB17636C}" type="datetime1">
               <a:rPr lang="en-US" smtClean="0"/>
               <a:pPr/>
-              <a:t>15-04-05</a:t>
+              <a:t>15-04-07</a:t>
             </a:fld>
             <a:endParaRPr lang="en-US"/>
           </a:p>
@@ -2733,7 +2733,7 @@
             <a:fld id="{936542C1-4E96-413B-B72E-6C4B39D85C9D}" type="datetime1">
               <a:rPr lang="en-US" smtClean="0"/>
               <a:pPr/>
-              <a:t>15-04-05</a:t>
+              <a:t>15-04-07</a:t>
             </a:fld>
             <a:endParaRPr lang="en-US"/>
           </a:p>
@@ -3097,7 +3097,7 @@
             <a:fld id="{F0542AA2-D442-471A-9D69-80392E1E581D}" type="datetime1">
               <a:rPr lang="en-US" smtClean="0"/>
               <a:pPr/>
-              <a:t>15-04-05</a:t>
+              <a:t>15-04-07</a:t>
             </a:fld>
             <a:endParaRPr lang="en-US" dirty="0"/>
           </a:p>
@@ -3433,7 +3433,7 @@
             <a:fld id="{EC43563C-D9B3-4432-B336-144C997D6215}" type="datetime1">
               <a:rPr lang="en-US" smtClean="0"/>
               <a:pPr/>
-              <a:t>15-04-05</a:t>
+              <a:t>15-04-07</a:t>
             </a:fld>
             <a:endParaRPr lang="en-US" dirty="0"/>
           </a:p>
@@ -3949,6 +3949,13 @@
   <p:clrMapOvr>
     <a:masterClrMapping/>
   </p:clrMapOvr>
+  <p:timing>
+    <p:tnLst>
+      <p:par>
+        <p:cTn xmlns:p14="http://schemas.microsoft.com/office/powerpoint/2010/main" id="1" dur="indefinite" restart="never" nodeType="tmRoot"/>
+      </p:par>
+    </p:tnLst>
+  </p:timing>
 </p:sld>
 </file>
 
@@ -4297,7 +4304,7 @@
         <p:spPr/>
         <p:txBody>
           <a:bodyPr>
-            <a:normAutofit/>
+            <a:normAutofit lnSpcReduction="10000"/>
           </a:bodyPr>
           <a:lstStyle/>
           <a:p>
@@ -4305,6 +4312,20 @@
               <a:rPr lang="en-US" sz="2400" dirty="0" smtClean="0"/>
               <a:t>Users can input a melody with no prior musical knowledge</a:t>
             </a:r>
+          </a:p>
+          <a:p>
+            <a:endParaRPr lang="en-US" sz="2400" dirty="0" smtClean="0"/>
+          </a:p>
+          <a:p>
+            <a:r>
+              <a:rPr lang="en-US" sz="2400" dirty="0" smtClean="0"/>
+              <a:t>Output will be all songs in database which match the </a:t>
+            </a:r>
+            <a:r>
+              <a:rPr lang="en-US" sz="2400" smtClean="0"/>
+              <a:t>inputted melody</a:t>
+            </a:r>
+            <a:endParaRPr lang="en-US" sz="2400"/>
           </a:p>
           <a:p>
             <a:endParaRPr lang="en-US" sz="2400" dirty="0" smtClean="0"/>
@@ -4571,6 +4592,13 @@
   <p:clrMapOvr>
     <a:masterClrMapping/>
   </p:clrMapOvr>
+  <p:timing>
+    <p:tnLst>
+      <p:par>
+        <p:cTn xmlns:p14="http://schemas.microsoft.com/office/powerpoint/2010/main" id="1" dur="indefinite" restart="never" nodeType="tmRoot"/>
+      </p:par>
+    </p:tnLst>
+  </p:timing>
 </p:sld>
 </file>
 
@@ -4748,6 +4776,13 @@
   <p:clrMapOvr>
     <a:masterClrMapping/>
   </p:clrMapOvr>
+  <p:timing>
+    <p:tnLst>
+      <p:par>
+        <p:cTn xmlns:p14="http://schemas.microsoft.com/office/powerpoint/2010/main" id="1" dur="indefinite" restart="never" nodeType="tmRoot"/>
+      </p:par>
+    </p:tnLst>
+  </p:timing>
 </p:sld>
 </file>
 
@@ -4861,6 +4896,13 @@
   <p:clrMapOvr>
     <a:masterClrMapping/>
   </p:clrMapOvr>
+  <p:timing>
+    <p:tnLst>
+      <p:par>
+        <p:cTn xmlns:p14="http://schemas.microsoft.com/office/powerpoint/2010/main" id="1" dur="indefinite" restart="never" nodeType="tmRoot"/>
+      </p:par>
+    </p:tnLst>
+  </p:timing>
 </p:sld>
 </file>
 
@@ -4943,6 +4985,13 @@
   <p:clrMapOvr>
     <a:masterClrMapping/>
   </p:clrMapOvr>
+  <p:timing>
+    <p:tnLst>
+      <p:par>
+        <p:cTn xmlns:p14="http://schemas.microsoft.com/office/powerpoint/2010/main" id="1" dur="indefinite" restart="never" nodeType="tmRoot"/>
+      </p:par>
+    </p:tnLst>
+  </p:timing>
 </p:sld>
 </file>
 

</xml_diff>